<commit_message>
corrected some mistakes in slide
</commit_message>
<xml_diff>
--- a/Data Science for Design.pptx
+++ b/Data Science for Design.pptx
@@ -381,7 +381,7 @@
           <a:p>
             <a:fld id="{3C9028CF-F6FB-415A-88F7-79616E04837E}" type="datetimeFigureOut">
               <a:rPr lang="en-GB" smtClean="0"/>
-              <a:t>2017-11-29</a:t>
+              <a:t>30/11/2017</a:t>
             </a:fld>
             <a:endParaRPr lang="en-GB"/>
           </a:p>
@@ -643,7 +643,7 @@
           <a:p>
             <a:fld id="{3C9028CF-F6FB-415A-88F7-79616E04837E}" type="datetimeFigureOut">
               <a:rPr lang="en-GB" smtClean="0"/>
-              <a:t>2017-11-29</a:t>
+              <a:t>30/11/2017</a:t>
             </a:fld>
             <a:endParaRPr lang="en-GB"/>
           </a:p>
@@ -878,7 +878,7 @@
           <a:p>
             <a:fld id="{3C9028CF-F6FB-415A-88F7-79616E04837E}" type="datetimeFigureOut">
               <a:rPr lang="en-GB" smtClean="0"/>
-              <a:t>2017-11-29</a:t>
+              <a:t>30/11/2017</a:t>
             </a:fld>
             <a:endParaRPr lang="en-GB"/>
           </a:p>
@@ -1118,7 +1118,7 @@
           <a:p>
             <a:fld id="{3C9028CF-F6FB-415A-88F7-79616E04837E}" type="datetimeFigureOut">
               <a:rPr lang="en-GB" smtClean="0"/>
-              <a:t>2017-11-29</a:t>
+              <a:t>30/11/2017</a:t>
             </a:fld>
             <a:endParaRPr lang="en-GB"/>
           </a:p>
@@ -1425,7 +1425,7 @@
           <a:p>
             <a:fld id="{3C9028CF-F6FB-415A-88F7-79616E04837E}" type="datetimeFigureOut">
               <a:rPr lang="en-GB" smtClean="0"/>
-              <a:t>2017-11-29</a:t>
+              <a:t>30/11/2017</a:t>
             </a:fld>
             <a:endParaRPr lang="en-GB"/>
           </a:p>
@@ -1727,7 +1727,7 @@
           <a:p>
             <a:fld id="{3C9028CF-F6FB-415A-88F7-79616E04837E}" type="datetimeFigureOut">
               <a:rPr lang="en-GB" smtClean="0"/>
-              <a:t>2017-11-29</a:t>
+              <a:t>30/11/2017</a:t>
             </a:fld>
             <a:endParaRPr lang="en-GB"/>
           </a:p>
@@ -2149,7 +2149,7 @@
           <a:p>
             <a:fld id="{3C9028CF-F6FB-415A-88F7-79616E04837E}" type="datetimeFigureOut">
               <a:rPr lang="en-GB" smtClean="0"/>
-              <a:t>2017-11-29</a:t>
+              <a:t>30/11/2017</a:t>
             </a:fld>
             <a:endParaRPr lang="en-GB"/>
           </a:p>
@@ -2311,7 +2311,7 @@
           <a:p>
             <a:fld id="{3C9028CF-F6FB-415A-88F7-79616E04837E}" type="datetimeFigureOut">
               <a:rPr lang="en-GB" smtClean="0"/>
-              <a:t>2017-11-29</a:t>
+              <a:t>30/11/2017</a:t>
             </a:fld>
             <a:endParaRPr lang="en-GB"/>
           </a:p>
@@ -2406,7 +2406,7 @@
           <a:p>
             <a:fld id="{3C9028CF-F6FB-415A-88F7-79616E04837E}" type="datetimeFigureOut">
               <a:rPr lang="en-GB" smtClean="0"/>
-              <a:t>2017-11-29</a:t>
+              <a:t>30/11/2017</a:t>
             </a:fld>
             <a:endParaRPr lang="en-GB"/>
           </a:p>
@@ -2784,7 +2784,7 @@
           <a:p>
             <a:fld id="{3C9028CF-F6FB-415A-88F7-79616E04837E}" type="datetimeFigureOut">
               <a:rPr lang="en-GB" smtClean="0"/>
-              <a:t>2017-11-29</a:t>
+              <a:t>30/11/2017</a:t>
             </a:fld>
             <a:endParaRPr lang="en-GB"/>
           </a:p>
@@ -3073,7 +3073,7 @@
           <a:p>
             <a:fld id="{3C9028CF-F6FB-415A-88F7-79616E04837E}" type="datetimeFigureOut">
               <a:rPr lang="en-GB" smtClean="0"/>
-              <a:t>2017-11-29</a:t>
+              <a:t>30/11/2017</a:t>
             </a:fld>
             <a:endParaRPr lang="en-GB"/>
           </a:p>
@@ -3284,7 +3284,7 @@
           <a:p>
             <a:fld id="{3C9028CF-F6FB-415A-88F7-79616E04837E}" type="datetimeFigureOut">
               <a:rPr lang="en-GB" smtClean="0"/>
-              <a:t>2017-11-29</a:t>
+              <a:t>30/11/2017</a:t>
             </a:fld>
             <a:endParaRPr lang="en-GB"/>
           </a:p>
@@ -3890,7 +3890,7 @@
           <p:cNvPr id="2" name="標題 1">
             <a:extLst>
               <a:ext uri="{FF2B5EF4-FFF2-40B4-BE49-F238E27FC236}">
-                <a16:creationId xmlns:a16="http://schemas.microsoft.com/office/drawing/2014/main" id="{120DA2F6-4E21-4108-87F7-17D028A694C1}"/>
+                <a16:creationId xmlns:a16="http://schemas.microsoft.com/office/drawing/2014/main" xmlns="" id="{120DA2F6-4E21-4108-87F7-17D028A694C1}"/>
               </a:ext>
             </a:extLst>
           </p:cNvPr>
@@ -3927,7 +3927,7 @@
           <p:cNvPr id="3" name="副標題 2">
             <a:extLst>
               <a:ext uri="{FF2B5EF4-FFF2-40B4-BE49-F238E27FC236}">
-                <a16:creationId xmlns:a16="http://schemas.microsoft.com/office/drawing/2014/main" id="{B5D3D9D8-55D3-46EF-9149-20884E78DBBC}"/>
+                <a16:creationId xmlns:a16="http://schemas.microsoft.com/office/drawing/2014/main" xmlns="" id="{B5D3D9D8-55D3-46EF-9149-20884E78DBBC}"/>
               </a:ext>
             </a:extLst>
           </p:cNvPr>
@@ -3987,7 +3987,7 @@
           <p:cNvPr id="5" name="圖片 4">
             <a:extLst>
               <a:ext uri="{FF2B5EF4-FFF2-40B4-BE49-F238E27FC236}">
-                <a16:creationId xmlns:a16="http://schemas.microsoft.com/office/drawing/2014/main" id="{6CDD0081-AF26-468A-9288-86C7F2E7BC32}"/>
+                <a16:creationId xmlns:a16="http://schemas.microsoft.com/office/drawing/2014/main" xmlns="" id="{6CDD0081-AF26-468A-9288-86C7F2E7BC32}"/>
               </a:ext>
             </a:extLst>
           </p:cNvPr>
@@ -4052,7 +4052,7 @@
           <p:cNvPr id="2" name="標題 1">
             <a:extLst>
               <a:ext uri="{FF2B5EF4-FFF2-40B4-BE49-F238E27FC236}">
-                <a16:creationId xmlns:a16="http://schemas.microsoft.com/office/drawing/2014/main" id="{231445B5-B914-4E9D-9656-DE9380A1A6BB}"/>
+                <a16:creationId xmlns:a16="http://schemas.microsoft.com/office/drawing/2014/main" xmlns="" id="{231445B5-B914-4E9D-9656-DE9380A1A6BB}"/>
               </a:ext>
             </a:extLst>
           </p:cNvPr>
@@ -4080,7 +4080,7 @@
           <p:cNvPr id="5" name="內容版面配置區 4">
             <a:extLst>
               <a:ext uri="{FF2B5EF4-FFF2-40B4-BE49-F238E27FC236}">
-                <a16:creationId xmlns:a16="http://schemas.microsoft.com/office/drawing/2014/main" id="{2CDF4C5E-5F5A-4831-BD67-74CC0FC810BB}"/>
+                <a16:creationId xmlns:a16="http://schemas.microsoft.com/office/drawing/2014/main" xmlns="" id="{2CDF4C5E-5F5A-4831-BD67-74CC0FC810BB}"/>
               </a:ext>
             </a:extLst>
           </p:cNvPr>
@@ -4114,7 +4114,7 @@
           <p:cNvPr id="9" name="圖片 8">
             <a:extLst>
               <a:ext uri="{FF2B5EF4-FFF2-40B4-BE49-F238E27FC236}">
-                <a16:creationId xmlns:a16="http://schemas.microsoft.com/office/drawing/2014/main" id="{D9FE6277-E9C6-4ABC-959D-E280BEC550DF}"/>
+                <a16:creationId xmlns:a16="http://schemas.microsoft.com/office/drawing/2014/main" xmlns="" id="{D9FE6277-E9C6-4ABC-959D-E280BEC550DF}"/>
               </a:ext>
             </a:extLst>
           </p:cNvPr>
@@ -4146,42 +4146,261 @@
       </p:pic>
       <p:sp>
         <p:nvSpPr>
-          <p:cNvPr id="10" name="文字方塊 9">
+          <p:cNvPr id="6" name="內容版面配置區 2">
             <a:extLst>
               <a:ext uri="{FF2B5EF4-FFF2-40B4-BE49-F238E27FC236}">
-                <a16:creationId xmlns:a16="http://schemas.microsoft.com/office/drawing/2014/main" id="{6D79E7D9-BDAC-45D7-AFFA-1329BC009EA8}"/>
+                <a16:creationId xmlns:a16="http://schemas.microsoft.com/office/drawing/2014/main" xmlns="" id="{897404A2-FC6F-45E0-8710-C6B53512EDA0}"/>
               </a:ext>
             </a:extLst>
           </p:cNvPr>
-          <p:cNvSpPr txBox="1"/>
+          <p:cNvSpPr txBox="1">
+            <a:spLocks/>
+          </p:cNvSpPr>
           <p:nvPr/>
         </p:nvSpPr>
         <p:spPr>
           <a:xfrm>
-            <a:off x="683580" y="5909645"/>
-            <a:ext cx="11029616" cy="646331"/>
+            <a:off x="581192" y="5877922"/>
+            <a:ext cx="11029615" cy="757085"/>
           </a:xfrm>
           <a:prstGeom prst="rect">
             <a:avLst/>
           </a:prstGeom>
-          <a:noFill/>
-        </p:spPr>
-        <p:txBody>
-          <a:bodyPr wrap="square" rtlCol="0">
-            <a:spAutoFit/>
+        </p:spPr>
+        <p:txBody>
+          <a:bodyPr vert="horz" lIns="91440" tIns="45720" rIns="91440" bIns="45720" rtlCol="0" anchor="ctr">
+            <a:normAutofit/>
           </a:bodyPr>
-          <a:lstStyle/>
-          <a:p>
-            <a:r>
-              <a:rPr lang="en-GB" dirty="0"/>
-              <a:t>Part3: New features</a:t>
-            </a:r>
-          </a:p>
-          <a:p>
-            <a:r>
-              <a:rPr lang="en-GB" dirty="0"/>
-              <a:t>The released month of new feature is good but released hour in the afternoon need to adjusted to a later time. </a:t>
-            </a:r>
+          <a:lstStyle>
+            <a:lvl1pPr marL="306000" indent="-306000" algn="l" defTabSz="457200" rtl="0" eaLnBrk="1" latinLnBrk="0" hangingPunct="1">
+              <a:spcBef>
+                <a:spcPct val="20000"/>
+              </a:spcBef>
+              <a:spcAft>
+                <a:spcPts val="600"/>
+              </a:spcAft>
+              <a:buClr>
+                <a:schemeClr val="accent2"/>
+              </a:buClr>
+              <a:buSzPct val="92000"/>
+              <a:buFont typeface="Wingdings 2" panose="05020102010507070707" pitchFamily="18" charset="2"/>
+              <a:buChar char=""/>
+              <a:defRPr sz="1800" kern="1200">
+                <a:solidFill>
+                  <a:schemeClr val="tx2"/>
+                </a:solidFill>
+                <a:latin typeface="+mn-lt"/>
+                <a:ea typeface="+mn-ea"/>
+                <a:cs typeface="+mn-cs"/>
+              </a:defRPr>
+            </a:lvl1pPr>
+            <a:lvl2pPr marL="630000" indent="-306000" algn="l" defTabSz="457200" rtl="0" eaLnBrk="1" latinLnBrk="0" hangingPunct="1">
+              <a:spcBef>
+                <a:spcPct val="20000"/>
+              </a:spcBef>
+              <a:spcAft>
+                <a:spcPts val="600"/>
+              </a:spcAft>
+              <a:buClr>
+                <a:schemeClr val="accent2"/>
+              </a:buClr>
+              <a:buSzPct val="92000"/>
+              <a:buFont typeface="Wingdings 2" panose="05020102010507070707" pitchFamily="18" charset="2"/>
+              <a:buChar char=""/>
+              <a:defRPr sz="1600" kern="1200">
+                <a:solidFill>
+                  <a:schemeClr val="tx2"/>
+                </a:solidFill>
+                <a:latin typeface="+mn-lt"/>
+                <a:ea typeface="+mn-ea"/>
+                <a:cs typeface="+mn-cs"/>
+              </a:defRPr>
+            </a:lvl2pPr>
+            <a:lvl3pPr marL="900000" indent="-270000" algn="l" defTabSz="457200" rtl="0" eaLnBrk="1" latinLnBrk="0" hangingPunct="1">
+              <a:spcBef>
+                <a:spcPct val="20000"/>
+              </a:spcBef>
+              <a:spcAft>
+                <a:spcPts val="600"/>
+              </a:spcAft>
+              <a:buClr>
+                <a:schemeClr val="accent2"/>
+              </a:buClr>
+              <a:buSzPct val="92000"/>
+              <a:buFont typeface="Wingdings 2" panose="05020102010507070707" pitchFamily="18" charset="2"/>
+              <a:buChar char=""/>
+              <a:defRPr sz="1400" kern="1200">
+                <a:solidFill>
+                  <a:schemeClr val="tx2"/>
+                </a:solidFill>
+                <a:latin typeface="+mn-lt"/>
+                <a:ea typeface="+mn-ea"/>
+                <a:cs typeface="+mn-cs"/>
+              </a:defRPr>
+            </a:lvl3pPr>
+            <a:lvl4pPr marL="1242000" indent="-234000" algn="l" defTabSz="457200" rtl="0" eaLnBrk="1" latinLnBrk="0" hangingPunct="1">
+              <a:spcBef>
+                <a:spcPct val="20000"/>
+              </a:spcBef>
+              <a:spcAft>
+                <a:spcPts val="600"/>
+              </a:spcAft>
+              <a:buClr>
+                <a:schemeClr val="accent2"/>
+              </a:buClr>
+              <a:buSzPct val="92000"/>
+              <a:buFont typeface="Wingdings 2" panose="05020102010507070707" pitchFamily="18" charset="2"/>
+              <a:buChar char=""/>
+              <a:defRPr sz="1200" kern="1200">
+                <a:solidFill>
+                  <a:schemeClr val="tx2"/>
+                </a:solidFill>
+                <a:latin typeface="+mn-lt"/>
+                <a:ea typeface="+mn-ea"/>
+                <a:cs typeface="+mn-cs"/>
+              </a:defRPr>
+            </a:lvl4pPr>
+            <a:lvl5pPr marL="1602000" indent="-234000" algn="l" defTabSz="457200" rtl="0" eaLnBrk="1" latinLnBrk="0" hangingPunct="1">
+              <a:spcBef>
+                <a:spcPct val="20000"/>
+              </a:spcBef>
+              <a:spcAft>
+                <a:spcPts val="600"/>
+              </a:spcAft>
+              <a:buClr>
+                <a:schemeClr val="accent2"/>
+              </a:buClr>
+              <a:buSzPct val="92000"/>
+              <a:buFont typeface="Wingdings 2" panose="05020102010507070707" pitchFamily="18" charset="2"/>
+              <a:buChar char=""/>
+              <a:defRPr sz="1200" kern="1200">
+                <a:solidFill>
+                  <a:schemeClr val="tx2"/>
+                </a:solidFill>
+                <a:latin typeface="+mn-lt"/>
+                <a:ea typeface="+mn-ea"/>
+                <a:cs typeface="+mn-cs"/>
+              </a:defRPr>
+            </a:lvl5pPr>
+            <a:lvl6pPr marL="1900000" indent="-228600" algn="l" defTabSz="457200" rtl="0" eaLnBrk="1" latinLnBrk="0" hangingPunct="1">
+              <a:spcBef>
+                <a:spcPct val="20000"/>
+              </a:spcBef>
+              <a:spcAft>
+                <a:spcPts val="600"/>
+              </a:spcAft>
+              <a:buClr>
+                <a:schemeClr val="accent2"/>
+              </a:buClr>
+              <a:buSzPct val="92000"/>
+              <a:buFont typeface="Wingdings 2" panose="05020102010507070707" pitchFamily="18" charset="2"/>
+              <a:buChar char=""/>
+              <a:defRPr sz="1200" kern="1200">
+                <a:solidFill>
+                  <a:schemeClr val="tx2"/>
+                </a:solidFill>
+                <a:latin typeface="+mn-lt"/>
+                <a:ea typeface="+mn-ea"/>
+                <a:cs typeface="+mn-cs"/>
+              </a:defRPr>
+            </a:lvl6pPr>
+            <a:lvl7pPr marL="2200000" indent="-228600" algn="l" defTabSz="457200" rtl="0" eaLnBrk="1" latinLnBrk="0" hangingPunct="1">
+              <a:spcBef>
+                <a:spcPct val="20000"/>
+              </a:spcBef>
+              <a:spcAft>
+                <a:spcPts val="600"/>
+              </a:spcAft>
+              <a:buClr>
+                <a:schemeClr val="accent2"/>
+              </a:buClr>
+              <a:buSzPct val="92000"/>
+              <a:buFont typeface="Wingdings 2" panose="05020102010507070707" pitchFamily="18" charset="2"/>
+              <a:buChar char=""/>
+              <a:defRPr sz="1200" kern="1200">
+                <a:solidFill>
+                  <a:schemeClr val="tx2"/>
+                </a:solidFill>
+                <a:latin typeface="+mn-lt"/>
+                <a:ea typeface="+mn-ea"/>
+                <a:cs typeface="+mn-cs"/>
+              </a:defRPr>
+            </a:lvl7pPr>
+            <a:lvl8pPr marL="2500000" indent="-228600" algn="l" defTabSz="457200" rtl="0" eaLnBrk="1" latinLnBrk="0" hangingPunct="1">
+              <a:spcBef>
+                <a:spcPct val="20000"/>
+              </a:spcBef>
+              <a:spcAft>
+                <a:spcPts val="600"/>
+              </a:spcAft>
+              <a:buClr>
+                <a:schemeClr val="accent2"/>
+              </a:buClr>
+              <a:buSzPct val="92000"/>
+              <a:buFont typeface="Wingdings 2" panose="05020102010507070707" pitchFamily="18" charset="2"/>
+              <a:buChar char=""/>
+              <a:defRPr sz="1200" kern="1200">
+                <a:solidFill>
+                  <a:schemeClr val="tx2"/>
+                </a:solidFill>
+                <a:latin typeface="+mn-lt"/>
+                <a:ea typeface="+mn-ea"/>
+                <a:cs typeface="+mn-cs"/>
+              </a:defRPr>
+            </a:lvl8pPr>
+            <a:lvl9pPr marL="2800000" indent="-228600" algn="l" defTabSz="457200" rtl="0" eaLnBrk="1" latinLnBrk="0" hangingPunct="1">
+              <a:spcBef>
+                <a:spcPct val="20000"/>
+              </a:spcBef>
+              <a:spcAft>
+                <a:spcPts val="600"/>
+              </a:spcAft>
+              <a:buClr>
+                <a:schemeClr val="accent2"/>
+              </a:buClr>
+              <a:buSzPct val="92000"/>
+              <a:buFont typeface="Wingdings 2" panose="05020102010507070707" pitchFamily="18" charset="2"/>
+              <a:buChar char=""/>
+              <a:defRPr sz="1200" kern="1200">
+                <a:solidFill>
+                  <a:schemeClr val="tx2"/>
+                </a:solidFill>
+                <a:latin typeface="+mn-lt"/>
+                <a:ea typeface="+mn-ea"/>
+                <a:cs typeface="+mn-cs"/>
+              </a:defRPr>
+            </a:lvl9pPr>
+          </a:lstStyle>
+          <a:p>
+            <a:r>
+              <a:rPr lang="en-GB" altLang="zh-CN" dirty="0" smtClean="0"/>
+              <a:t>Part3</a:t>
+            </a:r>
+            <a:r>
+              <a:rPr lang="en-GB" altLang="zh-CN" dirty="0"/>
+              <a:t>: </a:t>
+            </a:r>
+            <a:r>
+              <a:rPr lang="en-GB" altLang="zh-CN" dirty="0" smtClean="0"/>
+              <a:t>Relationship between New features and Login Time</a:t>
+            </a:r>
+            <a:endParaRPr lang="en-GB" altLang="zh-CN" dirty="0"/>
+          </a:p>
+          <a:p>
+            <a:pPr lvl="1"/>
+            <a:r>
+              <a:rPr lang="en-GB" altLang="zh-CN" dirty="0" smtClean="0"/>
+              <a:t>The </a:t>
+            </a:r>
+            <a:r>
+              <a:rPr lang="en-GB" altLang="zh-CN" dirty="0"/>
+              <a:t>released </a:t>
+            </a:r>
+            <a:r>
+              <a:rPr lang="en-GB" altLang="zh-CN" dirty="0" smtClean="0"/>
+              <a:t>time of new feature could be adjusted according  to participants’ login time. </a:t>
+            </a:r>
+            <a:endParaRPr lang="en-GB" altLang="zh-CN" dirty="0"/>
           </a:p>
         </p:txBody>
       </p:sp>
@@ -4195,6 +4414,13 @@
   <p:clrMapOvr>
     <a:masterClrMapping/>
   </p:clrMapOvr>
+  <p:timing>
+    <p:tnLst>
+      <p:par>
+        <p:cTn id="1" dur="indefinite" restart="never" nodeType="tmRoot"/>
+      </p:par>
+    </p:tnLst>
+  </p:timing>
 </p:sld>
 </file>
 
@@ -4220,7 +4446,7 @@
           <p:cNvPr id="2" name="標題 1">
             <a:extLst>
               <a:ext uri="{FF2B5EF4-FFF2-40B4-BE49-F238E27FC236}">
-                <a16:creationId xmlns:a16="http://schemas.microsoft.com/office/drawing/2014/main" id="{5B6620C4-C244-450B-A244-E4ED40FB65D7}"/>
+                <a16:creationId xmlns:a16="http://schemas.microsoft.com/office/drawing/2014/main" xmlns="" id="{5B6620C4-C244-450B-A244-E4ED40FB65D7}"/>
               </a:ext>
             </a:extLst>
           </p:cNvPr>
@@ -4248,7 +4474,7 @@
           <p:cNvPr id="3" name="內容版面配置區 2">
             <a:extLst>
               <a:ext uri="{FF2B5EF4-FFF2-40B4-BE49-F238E27FC236}">
-                <a16:creationId xmlns:a16="http://schemas.microsoft.com/office/drawing/2014/main" id="{3B9256CF-94B6-4EE7-8DD5-B342C65AC0ED}"/>
+                <a16:creationId xmlns:a16="http://schemas.microsoft.com/office/drawing/2014/main" xmlns="" id="{3B9256CF-94B6-4EE7-8DD5-B342C65AC0ED}"/>
               </a:ext>
             </a:extLst>
           </p:cNvPr>
@@ -4324,7 +4550,7 @@
           <p:cNvPr id="2" name="標題 1">
             <a:extLst>
               <a:ext uri="{FF2B5EF4-FFF2-40B4-BE49-F238E27FC236}">
-                <a16:creationId xmlns:a16="http://schemas.microsoft.com/office/drawing/2014/main" id="{D485F62F-ADF6-4FE9-8AD1-96E9FDEAE7AC}"/>
+                <a16:creationId xmlns:a16="http://schemas.microsoft.com/office/drawing/2014/main" xmlns="" id="{D485F62F-ADF6-4FE9-8AD1-96E9FDEAE7AC}"/>
               </a:ext>
             </a:extLst>
           </p:cNvPr>
@@ -4352,7 +4578,7 @@
           <p:cNvPr id="3" name="內容版面配置區 2">
             <a:extLst>
               <a:ext uri="{FF2B5EF4-FFF2-40B4-BE49-F238E27FC236}">
-                <a16:creationId xmlns:a16="http://schemas.microsoft.com/office/drawing/2014/main" id="{0A9DFD72-002C-40AD-A2B4-4C180A0BBC98}"/>
+                <a16:creationId xmlns:a16="http://schemas.microsoft.com/office/drawing/2014/main" xmlns="" id="{0A9DFD72-002C-40AD-A2B4-4C180A0BBC98}"/>
               </a:ext>
             </a:extLst>
           </p:cNvPr>
@@ -4425,7 +4651,7 @@
           <p:cNvPr id="2" name="標題 1">
             <a:extLst>
               <a:ext uri="{FF2B5EF4-FFF2-40B4-BE49-F238E27FC236}">
-                <a16:creationId xmlns:a16="http://schemas.microsoft.com/office/drawing/2014/main" id="{57A38D6B-4A73-4851-B559-6750610F23A9}"/>
+                <a16:creationId xmlns:a16="http://schemas.microsoft.com/office/drawing/2014/main" xmlns="" id="{57A38D6B-4A73-4851-B559-6750610F23A9}"/>
               </a:ext>
             </a:extLst>
           </p:cNvPr>
@@ -4453,7 +4679,7 @@
           <p:cNvPr id="3" name="內容版面配置區 2">
             <a:extLst>
               <a:ext uri="{FF2B5EF4-FFF2-40B4-BE49-F238E27FC236}">
-                <a16:creationId xmlns:a16="http://schemas.microsoft.com/office/drawing/2014/main" id="{034B727C-4334-43BF-86A6-D41ED58C4C81}"/>
+                <a16:creationId xmlns:a16="http://schemas.microsoft.com/office/drawing/2014/main" xmlns="" id="{034B727C-4334-43BF-86A6-D41ED58C4C81}"/>
               </a:ext>
             </a:extLst>
           </p:cNvPr>
@@ -4478,7 +4704,7 @@
           <p:cNvPr id="4" name="圖片 3">
             <a:extLst>
               <a:ext uri="{FF2B5EF4-FFF2-40B4-BE49-F238E27FC236}">
-                <a16:creationId xmlns:a16="http://schemas.microsoft.com/office/drawing/2014/main" id="{11363BFA-B08D-4348-BDE0-5BE75E09F47A}"/>
+                <a16:creationId xmlns:a16="http://schemas.microsoft.com/office/drawing/2014/main" xmlns="" id="{11363BFA-B08D-4348-BDE0-5BE75E09F47A}"/>
               </a:ext>
             </a:extLst>
           </p:cNvPr>
@@ -4538,7 +4764,7 @@
           <p:cNvPr id="2" name="標題 1">
             <a:extLst>
               <a:ext uri="{FF2B5EF4-FFF2-40B4-BE49-F238E27FC236}">
-                <a16:creationId xmlns:a16="http://schemas.microsoft.com/office/drawing/2014/main" id="{ED042D28-B829-4016-A2B5-D8370E329CD4}"/>
+                <a16:creationId xmlns:a16="http://schemas.microsoft.com/office/drawing/2014/main" xmlns="" id="{ED042D28-B829-4016-A2B5-D8370E329CD4}"/>
               </a:ext>
             </a:extLst>
           </p:cNvPr>
@@ -4566,7 +4792,7 @@
           <p:cNvPr id="3" name="內容版面配置區 2">
             <a:extLst>
               <a:ext uri="{FF2B5EF4-FFF2-40B4-BE49-F238E27FC236}">
-                <a16:creationId xmlns:a16="http://schemas.microsoft.com/office/drawing/2014/main" id="{2B8A1D51-797C-4F3F-83C7-5AAEEDF803A3}"/>
+                <a16:creationId xmlns:a16="http://schemas.microsoft.com/office/drawing/2014/main" xmlns="" id="{2B8A1D51-797C-4F3F-83C7-5AAEEDF803A3}"/>
               </a:ext>
             </a:extLst>
           </p:cNvPr>
@@ -4591,7 +4817,7 @@
           <p:cNvPr id="4" name="圖片 3">
             <a:extLst>
               <a:ext uri="{FF2B5EF4-FFF2-40B4-BE49-F238E27FC236}">
-                <a16:creationId xmlns:a16="http://schemas.microsoft.com/office/drawing/2014/main" id="{2B1A5FB2-E1B3-4FE5-9287-7715BFD1F1B6}"/>
+                <a16:creationId xmlns:a16="http://schemas.microsoft.com/office/drawing/2014/main" xmlns="" id="{2B1A5FB2-E1B3-4FE5-9287-7715BFD1F1B6}"/>
               </a:ext>
             </a:extLst>
           </p:cNvPr>
@@ -4651,7 +4877,7 @@
           <p:cNvPr id="2" name="標題 1">
             <a:extLst>
               <a:ext uri="{FF2B5EF4-FFF2-40B4-BE49-F238E27FC236}">
-                <a16:creationId xmlns:a16="http://schemas.microsoft.com/office/drawing/2014/main" id="{329144AF-F53D-48C6-ABC2-B2AA4671AF96}"/>
+                <a16:creationId xmlns:a16="http://schemas.microsoft.com/office/drawing/2014/main" xmlns="" id="{329144AF-F53D-48C6-ABC2-B2AA4671AF96}"/>
               </a:ext>
             </a:extLst>
           </p:cNvPr>
@@ -4681,7 +4907,7 @@
           <p:cNvPr id="3" name="內容版面配置區 2">
             <a:extLst>
               <a:ext uri="{FF2B5EF4-FFF2-40B4-BE49-F238E27FC236}">
-                <a16:creationId xmlns:a16="http://schemas.microsoft.com/office/drawing/2014/main" id="{3AE56DCC-F111-483E-8B4B-2226A5FCA9BA}"/>
+                <a16:creationId xmlns:a16="http://schemas.microsoft.com/office/drawing/2014/main" xmlns="" id="{3AE56DCC-F111-483E-8B4B-2226A5FCA9BA}"/>
               </a:ext>
             </a:extLst>
           </p:cNvPr>
@@ -4804,7 +5030,7 @@
           <p:cNvPr id="2" name="標題 1">
             <a:extLst>
               <a:ext uri="{FF2B5EF4-FFF2-40B4-BE49-F238E27FC236}">
-                <a16:creationId xmlns:a16="http://schemas.microsoft.com/office/drawing/2014/main" id="{5A488BC8-A6AF-4A34-9A6B-9EC9B9E8F1AC}"/>
+                <a16:creationId xmlns:a16="http://schemas.microsoft.com/office/drawing/2014/main" xmlns="" id="{5A488BC8-A6AF-4A34-9A6B-9EC9B9E8F1AC}"/>
               </a:ext>
             </a:extLst>
           </p:cNvPr>
@@ -4832,7 +5058,7 @@
           <p:cNvPr id="3" name="內容版面配置區 2">
             <a:extLst>
               <a:ext uri="{FF2B5EF4-FFF2-40B4-BE49-F238E27FC236}">
-                <a16:creationId xmlns:a16="http://schemas.microsoft.com/office/drawing/2014/main" id="{CA7088AF-6D6C-4315-B56C-6E7D20914FAA}"/>
+                <a16:creationId xmlns:a16="http://schemas.microsoft.com/office/drawing/2014/main" xmlns="" id="{CA7088AF-6D6C-4315-B56C-6E7D20914FAA}"/>
               </a:ext>
             </a:extLst>
           </p:cNvPr>
@@ -4869,7 +5095,7 @@
           <p:cNvPr id="4" name="圖片 3">
             <a:extLst>
               <a:ext uri="{FF2B5EF4-FFF2-40B4-BE49-F238E27FC236}">
-                <a16:creationId xmlns:a16="http://schemas.microsoft.com/office/drawing/2014/main" id="{AAC38FE6-03D4-4484-ACA2-DE9AD3FFC312}"/>
+                <a16:creationId xmlns:a16="http://schemas.microsoft.com/office/drawing/2014/main" xmlns="" id="{AAC38FE6-03D4-4484-ACA2-DE9AD3FFC312}"/>
               </a:ext>
             </a:extLst>
           </p:cNvPr>
@@ -4928,7 +5154,7 @@
           <p:cNvPr id="2" name="標題 1">
             <a:extLst>
               <a:ext uri="{FF2B5EF4-FFF2-40B4-BE49-F238E27FC236}">
-                <a16:creationId xmlns:a16="http://schemas.microsoft.com/office/drawing/2014/main" id="{6989BD54-0B77-4E82-8469-95E82990E835}"/>
+                <a16:creationId xmlns:a16="http://schemas.microsoft.com/office/drawing/2014/main" xmlns="" id="{6989BD54-0B77-4E82-8469-95E82990E835}"/>
               </a:ext>
             </a:extLst>
           </p:cNvPr>
@@ -4956,7 +5182,7 @@
           <p:cNvPr id="3" name="內容版面配置區 2">
             <a:extLst>
               <a:ext uri="{FF2B5EF4-FFF2-40B4-BE49-F238E27FC236}">
-                <a16:creationId xmlns:a16="http://schemas.microsoft.com/office/drawing/2014/main" id="{897404A2-FC6F-45E0-8710-C6B53512EDA0}"/>
+                <a16:creationId xmlns:a16="http://schemas.microsoft.com/office/drawing/2014/main" xmlns="" id="{897404A2-FC6F-45E0-8710-C6B53512EDA0}"/>
               </a:ext>
             </a:extLst>
           </p:cNvPr>
@@ -4995,7 +5221,15 @@
             <a:pPr lvl="1"/>
             <a:r>
               <a:rPr lang="en-GB" dirty="0"/>
-              <a:t>Participants aged 30-34 occupies the largest number of all participants</a:t>
+              <a:t>Participants aged 30-34 </a:t>
+            </a:r>
+            <a:r>
+              <a:rPr lang="en-GB" dirty="0" smtClean="0"/>
+              <a:t>occupy </a:t>
+            </a:r>
+            <a:r>
+              <a:rPr lang="en-GB" dirty="0"/>
+              <a:t>the largest number of all participants</a:t>
             </a:r>
           </a:p>
           <a:p>
@@ -5011,7 +5245,7 @@
           <p:cNvPr id="4" name="圖片 3">
             <a:extLst>
               <a:ext uri="{FF2B5EF4-FFF2-40B4-BE49-F238E27FC236}">
-                <a16:creationId xmlns:a16="http://schemas.microsoft.com/office/drawing/2014/main" id="{F064CF7E-89F9-47EC-9DCA-3D1BD6BE7EC7}"/>
+                <a16:creationId xmlns:a16="http://schemas.microsoft.com/office/drawing/2014/main" xmlns="" id="{F064CF7E-89F9-47EC-9DCA-3D1BD6BE7EC7}"/>
               </a:ext>
             </a:extLst>
           </p:cNvPr>
@@ -5047,7 +5281,7 @@
           <p:cNvPr id="5" name="圖片 4">
             <a:extLst>
               <a:ext uri="{FF2B5EF4-FFF2-40B4-BE49-F238E27FC236}">
-                <a16:creationId xmlns:a16="http://schemas.microsoft.com/office/drawing/2014/main" id="{F873916C-9B39-4DAD-8218-8986A392D044}"/>
+                <a16:creationId xmlns:a16="http://schemas.microsoft.com/office/drawing/2014/main" xmlns="" id="{F873916C-9B39-4DAD-8218-8986A392D044}"/>
               </a:ext>
             </a:extLst>
           </p:cNvPr>
@@ -5057,7 +5291,7 @@
           <p:nvPr/>
         </p:nvPicPr>
         <p:blipFill>
-          <a:blip r:embed="rId3">
+          <a:blip r:embed="rId3" cstate="print">
             <a:extLst>
               <a:ext uri="{28A0092B-C50C-407E-A947-70E740481C1C}">
                 <a14:useLocalDpi xmlns:a14="http://schemas.microsoft.com/office/drawing/2010/main" val="0"/>
@@ -5083,7 +5317,7 @@
           <p:cNvPr id="6" name="圖片 5">
             <a:extLst>
               <a:ext uri="{FF2B5EF4-FFF2-40B4-BE49-F238E27FC236}">
-                <a16:creationId xmlns:a16="http://schemas.microsoft.com/office/drawing/2014/main" id="{C8EF0A47-CBB4-4BF3-9A17-AA050A03F7D5}"/>
+                <a16:creationId xmlns:a16="http://schemas.microsoft.com/office/drawing/2014/main" xmlns="" id="{C8EF0A47-CBB4-4BF3-9A17-AA050A03F7D5}"/>
               </a:ext>
             </a:extLst>
           </p:cNvPr>
@@ -5123,6 +5357,13 @@
   <p:clrMapOvr>
     <a:masterClrMapping/>
   </p:clrMapOvr>
+  <p:timing>
+    <p:tnLst>
+      <p:par>
+        <p:cTn id="1" dur="indefinite" restart="never" nodeType="tmRoot"/>
+      </p:par>
+    </p:tnLst>
+  </p:timing>
 </p:sld>
 </file>
 
@@ -5148,7 +5389,7 @@
           <p:cNvPr id="2" name="標題 1">
             <a:extLst>
               <a:ext uri="{FF2B5EF4-FFF2-40B4-BE49-F238E27FC236}">
-                <a16:creationId xmlns:a16="http://schemas.microsoft.com/office/drawing/2014/main" id="{6989BD54-0B77-4E82-8469-95E82990E835}"/>
+                <a16:creationId xmlns:a16="http://schemas.microsoft.com/office/drawing/2014/main" xmlns="" id="{6989BD54-0B77-4E82-8469-95E82990E835}"/>
               </a:ext>
             </a:extLst>
           </p:cNvPr>
@@ -5167,62 +5408,6 @@
             <a:r>
               <a:rPr lang="en-GB" dirty="0"/>
               <a:t>Demonstration</a:t>
-            </a:r>
-          </a:p>
-        </p:txBody>
-      </p:sp>
-      <p:sp>
-        <p:nvSpPr>
-          <p:cNvPr id="3" name="內容版面配置區 2">
-            <a:extLst>
-              <a:ext uri="{FF2B5EF4-FFF2-40B4-BE49-F238E27FC236}">
-                <a16:creationId xmlns:a16="http://schemas.microsoft.com/office/drawing/2014/main" id="{897404A2-FC6F-45E0-8710-C6B53512EDA0}"/>
-              </a:ext>
-            </a:extLst>
-          </p:cNvPr>
-          <p:cNvSpPr>
-            <a:spLocks noGrp="1"/>
-          </p:cNvSpPr>
-          <p:nvPr>
-            <p:ph idx="1"/>
-          </p:nvPr>
-        </p:nvSpPr>
-        <p:spPr>
-          <a:xfrm>
-            <a:off x="581192" y="2180497"/>
-            <a:ext cx="11029615" cy="1477104"/>
-          </a:xfrm>
-        </p:spPr>
-        <p:txBody>
-          <a:bodyPr>
-            <a:normAutofit fontScale="92500" lnSpcReduction="20000"/>
-          </a:bodyPr>
-          <a:lstStyle/>
-          <a:p>
-            <a:r>
-              <a:rPr lang="en-GB" dirty="0"/>
-              <a:t>Part2: The details of login</a:t>
-            </a:r>
-          </a:p>
-          <a:p>
-            <a:pPr lvl="1"/>
-            <a:r>
-              <a:rPr lang="en-GB" dirty="0"/>
-              <a:t>Most participant log in duration is below 500 second (8 minute 20 second) and there are only very few people logged in over 2000 second (33 minute 20 second).</a:t>
-            </a:r>
-          </a:p>
-          <a:p>
-            <a:pPr lvl="1"/>
-            <a:r>
-              <a:rPr lang="en-GB" dirty="0"/>
-              <a:t>The user largest logged in times 265, the average log in time is around 24, and the smallest log in time is 1.</a:t>
-            </a:r>
-          </a:p>
-          <a:p>
-            <a:pPr lvl="1"/>
-            <a:r>
-              <a:rPr lang="en-GB" dirty="0"/>
-              <a:t>Participants tend to login to system after summer.</a:t>
             </a:r>
           </a:p>
         </p:txBody>
@@ -5232,7 +5417,7 @@
           <p:cNvPr id="8" name="圖片 7">
             <a:extLst>
               <a:ext uri="{FF2B5EF4-FFF2-40B4-BE49-F238E27FC236}">
-                <a16:creationId xmlns:a16="http://schemas.microsoft.com/office/drawing/2014/main" id="{BA4C5367-9D5A-4610-B138-5946C11A47EE}"/>
+                <a16:creationId xmlns:a16="http://schemas.microsoft.com/office/drawing/2014/main" xmlns="" id="{BA4C5367-9D5A-4610-B138-5946C11A47EE}"/>
               </a:ext>
             </a:extLst>
           </p:cNvPr>
@@ -5268,7 +5453,7 @@
           <p:cNvPr id="10" name="圖片 9">
             <a:extLst>
               <a:ext uri="{FF2B5EF4-FFF2-40B4-BE49-F238E27FC236}">
-                <a16:creationId xmlns:a16="http://schemas.microsoft.com/office/drawing/2014/main" id="{835A0584-1F1B-47C4-8D84-C9A9DE80ED3B}"/>
+                <a16:creationId xmlns:a16="http://schemas.microsoft.com/office/drawing/2014/main" xmlns="" id="{835A0584-1F1B-47C4-8D84-C9A9DE80ED3B}"/>
               </a:ext>
             </a:extLst>
           </p:cNvPr>
@@ -5290,14 +5475,128 @@
         </p:blipFill>
         <p:spPr>
           <a:xfrm>
-            <a:off x="6777227" y="3454538"/>
-            <a:ext cx="4833580" cy="3064064"/>
+            <a:off x="6056671" y="3657600"/>
+            <a:ext cx="5554136" cy="2861001"/>
           </a:xfrm>
           <a:prstGeom prst="rect">
             <a:avLst/>
           </a:prstGeom>
         </p:spPr>
       </p:pic>
+      <p:sp>
+        <p:nvSpPr>
+          <p:cNvPr id="3" name="內容版面配置區 2">
+            <a:extLst>
+              <a:ext uri="{FF2B5EF4-FFF2-40B4-BE49-F238E27FC236}">
+                <a16:creationId xmlns:a16="http://schemas.microsoft.com/office/drawing/2014/main" xmlns="" id="{897404A2-FC6F-45E0-8710-C6B53512EDA0}"/>
+              </a:ext>
+            </a:extLst>
+          </p:cNvPr>
+          <p:cNvSpPr>
+            <a:spLocks noGrp="1"/>
+          </p:cNvSpPr>
+          <p:nvPr>
+            <p:ph idx="1"/>
+          </p:nvPr>
+        </p:nvSpPr>
+        <p:spPr>
+          <a:xfrm>
+            <a:off x="581192" y="2180497"/>
+            <a:ext cx="11029615" cy="1477104"/>
+          </a:xfrm>
+        </p:spPr>
+        <p:txBody>
+          <a:bodyPr>
+            <a:normAutofit fontScale="92500" lnSpcReduction="20000"/>
+          </a:bodyPr>
+          <a:lstStyle/>
+          <a:p>
+            <a:r>
+              <a:rPr lang="en-GB" dirty="0"/>
+              <a:t>Part2: The details of login</a:t>
+            </a:r>
+          </a:p>
+          <a:p>
+            <a:pPr lvl="1"/>
+            <a:r>
+              <a:rPr lang="en-GB" dirty="0"/>
+              <a:t>Most participant log in duration is below 500 second (8 minute 20 second) and there are only very few people logged in over 2000 second (33 minute 20 second).</a:t>
+            </a:r>
+          </a:p>
+          <a:p>
+            <a:pPr lvl="1"/>
+            <a:r>
+              <a:rPr lang="en-GB" dirty="0"/>
+              <a:t>The </a:t>
+            </a:r>
+            <a:r>
+              <a:rPr lang="en-GB" dirty="0" smtClean="0"/>
+              <a:t>maximum of logged </a:t>
+            </a:r>
+            <a:r>
+              <a:rPr lang="en-GB" dirty="0"/>
+              <a:t>in </a:t>
+            </a:r>
+            <a:r>
+              <a:rPr lang="en-GB" dirty="0" smtClean="0"/>
+              <a:t>times is 265 times, </a:t>
+            </a:r>
+            <a:r>
+              <a:rPr lang="en-GB" dirty="0"/>
+              <a:t>the average </a:t>
+            </a:r>
+            <a:r>
+              <a:rPr lang="en-GB" dirty="0" smtClean="0"/>
+              <a:t>of log </a:t>
+            </a:r>
+            <a:r>
+              <a:rPr lang="en-GB" dirty="0"/>
+              <a:t>in time is around </a:t>
+            </a:r>
+            <a:r>
+              <a:rPr lang="en-GB" dirty="0" smtClean="0"/>
+              <a:t>24 times, </a:t>
+            </a:r>
+            <a:r>
+              <a:rPr lang="en-GB" dirty="0"/>
+              <a:t>and the </a:t>
+            </a:r>
+            <a:r>
+              <a:rPr lang="en-GB" dirty="0" smtClean="0"/>
+              <a:t>minimum </a:t>
+            </a:r>
+            <a:r>
+              <a:rPr lang="en-GB" dirty="0"/>
+              <a:t>log in time is </a:t>
+            </a:r>
+            <a:r>
+              <a:rPr lang="en-GB" dirty="0" smtClean="0"/>
+              <a:t>1 time.</a:t>
+            </a:r>
+            <a:endParaRPr lang="en-GB" dirty="0"/>
+          </a:p>
+          <a:p>
+            <a:pPr lvl="1"/>
+            <a:r>
+              <a:rPr lang="en-GB" dirty="0"/>
+              <a:t>Participants tend to login to </a:t>
+            </a:r>
+            <a:r>
+              <a:rPr lang="en-GB" dirty="0" smtClean="0"/>
+              <a:t>IDEAL</a:t>
+            </a:r>
+            <a:r>
+              <a:rPr lang="en-GB" dirty="0" smtClean="0"/>
+              <a:t> from July to October. (Midsummer </a:t>
+            </a:r>
+            <a:r>
+              <a:rPr lang="en-GB" dirty="0" smtClean="0"/>
+              <a:t>to autumn.)</a:t>
+            </a:r>
+            <a:endParaRPr lang="en-GB" dirty="0" smtClean="0"/>
+          </a:p>
+        </p:txBody>
+      </p:sp>
     </p:spTree>
     <p:extLst>
       <p:ext uri="{BB962C8B-B14F-4D97-AF65-F5344CB8AC3E}">
@@ -5308,6 +5607,13 @@
   <p:clrMapOvr>
     <a:masterClrMapping/>
   </p:clrMapOvr>
+  <p:timing>
+    <p:tnLst>
+      <p:par>
+        <p:cTn id="1" dur="indefinite" restart="never" nodeType="tmRoot"/>
+      </p:par>
+    </p:tnLst>
+  </p:timing>
 </p:sld>
 </file>
 

</xml_diff>